<commit_message>
added ui project; added microsoft glee library
</commit_message>
<xml_diff>
--- a/PaperWork/Presentation.pptx
+++ b/PaperWork/Presentation.pptx
@@ -5,7 +5,7 @@
     <p:sldMasterId id="2147483672" r:id="rId1"/>
   </p:sldMasterIdLst>
   <p:notesMasterIdLst>
-    <p:notesMasterId r:id="rId17"/>
+    <p:notesMasterId r:id="rId18"/>
   </p:notesMasterIdLst>
   <p:sldIdLst>
     <p:sldId id="256" r:id="rId2"/>
@@ -18,11 +18,12 @@
     <p:sldId id="267" r:id="rId9"/>
     <p:sldId id="266" r:id="rId10"/>
     <p:sldId id="268" r:id="rId11"/>
-    <p:sldId id="259" r:id="rId12"/>
-    <p:sldId id="269" r:id="rId13"/>
-    <p:sldId id="270" r:id="rId14"/>
+    <p:sldId id="273" r:id="rId12"/>
+    <p:sldId id="259" r:id="rId13"/>
+    <p:sldId id="269" r:id="rId14"/>
     <p:sldId id="271" r:id="rId15"/>
-    <p:sldId id="264" r:id="rId16"/>
+    <p:sldId id="272" r:id="rId16"/>
+    <p:sldId id="264" r:id="rId17"/>
   </p:sldIdLst>
   <p:sldSz cx="9144000" cy="6858000" type="screen4x3"/>
   <p:notesSz cx="6858000" cy="9144000"/>
@@ -206,7 +207,7 @@
           <a:p>
             <a:fld id="{F05F14F9-A9BB-4544-A6F6-2CF3DCC96380}" type="datetimeFigureOut">
               <a:rPr lang="en-US" smtClean="0"/>
-              <a:t>5/7/2012</a:t>
+              <a:t>5/8/2012</a:t>
             </a:fld>
             <a:endParaRPr lang="en-US"/>
           </a:p>
@@ -751,7 +752,7 @@
             <a:fld id="{1D8BD707-D9CF-40AE-B4C6-C98DA3205C09}" type="datetimeFigureOut">
               <a:rPr lang="en-US" smtClean="0"/>
               <a:pPr/>
-              <a:t>5/7/2012</a:t>
+              <a:t>5/8/2012</a:t>
             </a:fld>
             <a:endParaRPr lang="en-US"/>
           </a:p>
@@ -918,7 +919,7 @@
             <a:fld id="{1D8BD707-D9CF-40AE-B4C6-C98DA3205C09}" type="datetimeFigureOut">
               <a:rPr lang="en-US" smtClean="0"/>
               <a:pPr/>
-              <a:t>5/7/2012</a:t>
+              <a:t>5/8/2012</a:t>
             </a:fld>
             <a:endParaRPr lang="en-US"/>
           </a:p>
@@ -1095,7 +1096,7 @@
             <a:fld id="{1D8BD707-D9CF-40AE-B4C6-C98DA3205C09}" type="datetimeFigureOut">
               <a:rPr lang="en-US" smtClean="0"/>
               <a:pPr/>
-              <a:t>5/7/2012</a:t>
+              <a:t>5/8/2012</a:t>
             </a:fld>
             <a:endParaRPr lang="en-US"/>
           </a:p>
@@ -1280,7 +1281,7 @@
             <a:fld id="{1D8BD707-D9CF-40AE-B4C6-C98DA3205C09}" type="datetimeFigureOut">
               <a:rPr lang="en-US" smtClean="0"/>
               <a:pPr/>
-              <a:t>5/7/2012</a:t>
+              <a:t>5/8/2012</a:t>
             </a:fld>
             <a:endParaRPr lang="en-US"/>
           </a:p>
@@ -1544,7 +1545,7 @@
             <a:fld id="{1D8BD707-D9CF-40AE-B4C6-C98DA3205C09}" type="datetimeFigureOut">
               <a:rPr lang="en-US" smtClean="0"/>
               <a:pPr/>
-              <a:t>5/7/2012</a:t>
+              <a:t>5/8/2012</a:t>
             </a:fld>
             <a:endParaRPr lang="en-US"/>
           </a:p>
@@ -1894,7 +1895,7 @@
             <a:fld id="{1D8BD707-D9CF-40AE-B4C6-C98DA3205C09}" type="datetimeFigureOut">
               <a:rPr lang="en-US" smtClean="0"/>
               <a:pPr/>
-              <a:t>5/7/2012</a:t>
+              <a:t>5/8/2012</a:t>
             </a:fld>
             <a:endParaRPr lang="en-US"/>
           </a:p>
@@ -2204,7 +2205,7 @@
             <a:fld id="{1D8BD707-D9CF-40AE-B4C6-C98DA3205C09}" type="datetimeFigureOut">
               <a:rPr lang="en-US" smtClean="0"/>
               <a:pPr/>
-              <a:t>5/7/2012</a:t>
+              <a:t>5/8/2012</a:t>
             </a:fld>
             <a:endParaRPr lang="en-US"/>
           </a:p>
@@ -2433,7 +2434,7 @@
             <a:fld id="{1D8BD707-D9CF-40AE-B4C6-C98DA3205C09}" type="datetimeFigureOut">
               <a:rPr lang="en-US" smtClean="0"/>
               <a:pPr/>
-              <a:t>5/7/2012</a:t>
+              <a:t>5/8/2012</a:t>
             </a:fld>
             <a:endParaRPr lang="en-US"/>
           </a:p>
@@ -2525,7 +2526,7 @@
             <a:fld id="{1D8BD707-D9CF-40AE-B4C6-C98DA3205C09}" type="datetimeFigureOut">
               <a:rPr lang="en-US" smtClean="0"/>
               <a:pPr/>
-              <a:t>5/7/2012</a:t>
+              <a:t>5/8/2012</a:t>
             </a:fld>
             <a:endParaRPr lang="en-US"/>
           </a:p>
@@ -2815,7 +2816,7 @@
             <a:fld id="{1D8BD707-D9CF-40AE-B4C6-C98DA3205C09}" type="datetimeFigureOut">
               <a:rPr lang="en-US" smtClean="0"/>
               <a:pPr/>
-              <a:t>5/7/2012</a:t>
+              <a:t>5/8/2012</a:t>
             </a:fld>
             <a:endParaRPr lang="en-US"/>
           </a:p>
@@ -3086,7 +3087,7 @@
             <a:fld id="{1D8BD707-D9CF-40AE-B4C6-C98DA3205C09}" type="datetimeFigureOut">
               <a:rPr lang="en-US" smtClean="0"/>
               <a:pPr/>
-              <a:t>5/7/2012</a:t>
+              <a:t>5/8/2012</a:t>
             </a:fld>
             <a:endParaRPr lang="en-US"/>
           </a:p>
@@ -3298,7 +3299,7 @@
             <a:fld id="{1D8BD707-D9CF-40AE-B4C6-C98DA3205C09}" type="datetimeFigureOut">
               <a:rPr lang="en-US" smtClean="0"/>
               <a:pPr/>
-              <a:t>5/7/2012</a:t>
+              <a:t>5/8/2012</a:t>
             </a:fld>
             <a:endParaRPr lang="en-US"/>
           </a:p>
@@ -4265,6 +4266,116 @@
           <a:p>
             <a:r>
               <a:rPr lang="uk-UA" b="1" dirty="0" smtClean="0"/>
+              <a:t>Оптимальна гра</a:t>
+            </a:r>
+            <a:endParaRPr lang="en-US" b="1" dirty="0"/>
+          </a:p>
+        </p:txBody>
+      </p:sp>
+      <p:sp>
+        <p:nvSpPr>
+          <p:cNvPr id="4" name="Title 1"/>
+          <p:cNvSpPr txBox="1">
+            <a:spLocks/>
+          </p:cNvSpPr>
+          <p:nvPr/>
+        </p:nvSpPr>
+        <p:spPr>
+          <a:xfrm>
+            <a:off x="0" y="2819400"/>
+            <a:ext cx="9144000" cy="2438400"/>
+          </a:xfrm>
+          <a:prstGeom prst="rect">
+            <a:avLst/>
+          </a:prstGeom>
+        </p:spPr>
+        <p:txBody>
+          <a:bodyPr vert="horz" lIns="91440" tIns="45720" rIns="91440" bIns="45720" rtlCol="0" anchor="b">
+            <a:noAutofit/>
+          </a:bodyPr>
+          <a:lstStyle>
+            <a:lvl1pPr algn="ctr" defTabSz="914400" rtl="0" eaLnBrk="1" latinLnBrk="0" hangingPunct="1">
+              <a:lnSpc>
+                <a:spcPts val="5800"/>
+              </a:lnSpc>
+              <a:spcBef>
+                <a:spcPct val="0"/>
+              </a:spcBef>
+              <a:buNone/>
+              <a:defRPr sz="5400" kern="1200">
+                <a:solidFill>
+                  <a:schemeClr val="tx2"/>
+                </a:solidFill>
+                <a:effectLst>
+                  <a:outerShdw blurRad="63500" dist="38100" dir="5400000" algn="t" rotWithShape="0">
+                    <a:prstClr val="black">
+                      <a:alpha val="25000"/>
+                    </a:prstClr>
+                  </a:outerShdw>
+                </a:effectLst>
+                <a:latin typeface="+mn-lt"/>
+                <a:ea typeface="+mj-ea"/>
+                <a:cs typeface="+mj-cs"/>
+              </a:defRPr>
+            </a:lvl1pPr>
+          </a:lstStyle>
+          <a:p>
+            <a:pPr lvl="0"/>
+            <a:r>
+              <a:rPr lang="uk-UA" dirty="0" smtClean="0"/>
+              <a:t>Оптимальній хід можна знайти розв’язавши відповідне нім-рівняння</a:t>
+            </a:r>
+            <a:endParaRPr lang="en-US" dirty="0"/>
+          </a:p>
+        </p:txBody>
+      </p:sp>
+    </p:spTree>
+    <p:extLst>
+      <p:ext uri="{BB962C8B-B14F-4D97-AF65-F5344CB8AC3E}">
+        <p14:creationId xmlns:p14="http://schemas.microsoft.com/office/powerpoint/2010/main" val="1476201824"/>
+      </p:ext>
+    </p:extLst>
+  </p:cSld>
+  <p:clrMapOvr>
+    <a:masterClrMapping/>
+  </p:clrMapOvr>
+</p:sld>
+</file>
+
+<file path=ppt/slides/slide12.xml><?xml version="1.0" encoding="utf-8"?>
+<p:sld xmlns:a="http://schemas.openxmlformats.org/drawingml/2006/main" xmlns:r="http://schemas.openxmlformats.org/officeDocument/2006/relationships" xmlns:p="http://schemas.openxmlformats.org/presentationml/2006/main">
+  <p:cSld>
+    <p:spTree>
+      <p:nvGrpSpPr>
+        <p:cNvPr id="1" name=""/>
+        <p:cNvGrpSpPr/>
+        <p:nvPr/>
+      </p:nvGrpSpPr>
+      <p:grpSpPr>
+        <a:xfrm>
+          <a:off x="0" y="0"/>
+          <a:ext cx="0" cy="0"/>
+          <a:chOff x="0" y="0"/>
+          <a:chExt cx="0" cy="0"/>
+        </a:xfrm>
+      </p:grpSpPr>
+      <p:sp>
+        <p:nvSpPr>
+          <p:cNvPr id="2" name="Title 1"/>
+          <p:cNvSpPr>
+            <a:spLocks noGrp="1"/>
+          </p:cNvSpPr>
+          <p:nvPr>
+            <p:ph type="title"/>
+          </p:nvPr>
+        </p:nvSpPr>
+        <p:spPr/>
+        <p:txBody>
+          <a:bodyPr/>
+          <a:lstStyle/>
+          <a:p>
+            <a:r>
+              <a:rPr lang="uk-UA" b="1" dirty="0" smtClean="0"/>
               <a:t>Приклад</a:t>
             </a:r>
             <a:endParaRPr lang="en-US" b="1" dirty="0"/>
@@ -4608,7 +4719,7 @@
 </p:sld>
 </file>
 
-<file path=ppt/slides/slide12.xml><?xml version="1.0" encoding="utf-8"?>
+<file path=ppt/slides/slide13.xml><?xml version="1.0" encoding="utf-8"?>
 <p:sld xmlns:a="http://schemas.openxmlformats.org/drawingml/2006/main" xmlns:r="http://schemas.openxmlformats.org/officeDocument/2006/relationships" xmlns:p="http://schemas.openxmlformats.org/presentationml/2006/main">
   <p:cSld>
     <p:spTree>
@@ -5178,7 +5289,7 @@
 </p:sld>
 </file>
 
-<file path=ppt/slides/slide13.xml><?xml version="1.0" encoding="utf-8"?>
+<file path=ppt/slides/slide14.xml><?xml version="1.0" encoding="utf-8"?>
 <p:sld xmlns:a="http://schemas.openxmlformats.org/drawingml/2006/main" xmlns:r="http://schemas.openxmlformats.org/officeDocument/2006/relationships" xmlns:p="http://schemas.openxmlformats.org/presentationml/2006/main">
   <p:cSld>
     <p:spTree>
@@ -5268,7 +5379,19 @@
           <a:p>
             <a:r>
               <a:rPr lang="uk-UA" sz="4400" dirty="0" smtClean="0"/>
-              <a:t>Гра «Кеглі»</a:t>
+              <a:t>Гра «Гризун» («</a:t>
+            </a:r>
+            <a:r>
+              <a:rPr lang="en-US" sz="4400" dirty="0" smtClean="0"/>
+              <a:t>Chomp</a:t>
+            </a:r>
+            <a:r>
+              <a:rPr lang="uk-UA" sz="4400" dirty="0" smtClean="0"/>
+              <a:t>»</a:t>
+            </a:r>
+            <a:r>
+              <a:rPr lang="en-US" sz="4400" dirty="0" smtClean="0"/>
+              <a:t>)</a:t>
             </a:r>
             <a:endParaRPr lang="en-US" sz="4400" dirty="0"/>
           </a:p>
@@ -5276,485 +5399,6 @@
       </p:sp>
       <mc:AlternateContent xmlns:mc="http://schemas.openxmlformats.org/markup-compatibility/2006" xmlns:a14="http://schemas.microsoft.com/office/drawing/2010/main">
         <mc:Choice Requires="a14">
-          <p:sp>
-            <p:nvSpPr>
-              <p:cNvPr id="7" name="Content Placeholder 2"/>
-              <p:cNvSpPr>
-                <a:spLocks noGrp="1"/>
-              </p:cNvSpPr>
-              <p:nvPr>
-                <p:ph idx="1"/>
-              </p:nvPr>
-            </p:nvSpPr>
-            <p:spPr>
-              <a:xfrm>
-                <a:off x="152400" y="3733800"/>
-                <a:ext cx="8991600" cy="762000"/>
-              </a:xfrm>
-            </p:spPr>
-            <p:txBody>
-              <a:bodyPr>
-                <a:noAutofit/>
-              </a:bodyPr>
-              <a:lstStyle/>
-              <a:p>
-                <a14:m>
-                  <m:oMath xmlns:m="http://schemas.openxmlformats.org/officeDocument/2006/math">
-                    <m:r>
-                      <a:rPr lang="en-US" sz="2200" i="1">
-                        <a:latin typeface="Cambria Math"/>
-                      </a:rPr>
-                      <m:t>𝑔</m:t>
-                    </m:r>
-                    <m:d>
-                      <m:dPr>
-                        <m:ctrlPr>
-                          <a:rPr lang="en-US" sz="2200" i="1">
-                            <a:latin typeface="Cambria Math"/>
-                          </a:rPr>
-                        </m:ctrlPr>
-                      </m:dPr>
-                      <m:e>
-                        <m:r>
-                          <a:rPr lang="en-US" sz="2200" i="1">
-                            <a:latin typeface="Cambria Math"/>
-                          </a:rPr>
-                          <m:t>𝑛</m:t>
-                        </m:r>
-                      </m:e>
-                    </m:d>
-                    <m:r>
-                      <a:rPr lang="en-US" sz="2200" i="1">
-                        <a:latin typeface="Cambria Math"/>
-                      </a:rPr>
-                      <m:t>=</m:t>
-                    </m:r>
-                    <m:r>
-                      <a:rPr lang="en-US" sz="2200" i="1">
-                        <a:latin typeface="Cambria Math"/>
-                      </a:rPr>
-                      <m:t>𝑚𝑒𝑥</m:t>
-                    </m:r>
-                    <m:d>
-                      <m:dPr>
-                        <m:begChr m:val="{"/>
-                        <m:endChr m:val="}"/>
-                        <m:ctrlPr>
-                          <a:rPr lang="en-US" sz="2200" i="1">
-                            <a:latin typeface="Cambria Math"/>
-                          </a:rPr>
-                        </m:ctrlPr>
-                      </m:dPr>
-                      <m:e>
-                        <m:nary>
-                          <m:naryPr>
-                            <m:chr m:val="⋃"/>
-                            <m:limLoc m:val="undOvr"/>
-                            <m:ctrlPr>
-                              <a:rPr lang="en-US" sz="2200" i="1">
-                                <a:latin typeface="Cambria Math"/>
-                              </a:rPr>
-                            </m:ctrlPr>
-                          </m:naryPr>
-                          <m:sub>
-                            <m:r>
-                              <a:rPr lang="en-US" sz="2200" i="1">
-                                <a:latin typeface="Cambria Math"/>
-                              </a:rPr>
-                              <m:t>𝑖</m:t>
-                            </m:r>
-                            <m:r>
-                              <a:rPr lang="en-US" sz="2200" i="1">
-                                <a:latin typeface="Cambria Math"/>
-                              </a:rPr>
-                              <m:t>=0</m:t>
-                            </m:r>
-                          </m:sub>
-                          <m:sup>
-                            <m:r>
-                              <a:rPr lang="en-US" sz="2200" i="1">
-                                <a:latin typeface="Cambria Math"/>
-                              </a:rPr>
-                              <m:t>𝑛</m:t>
-                            </m:r>
-                            <m:r>
-                              <a:rPr lang="en-US" sz="2200" i="1">
-                                <a:latin typeface="Cambria Math"/>
-                              </a:rPr>
-                              <m:t>−1</m:t>
-                            </m:r>
-                          </m:sup>
-                          <m:e>
-                            <m:r>
-                              <a:rPr lang="en-US" sz="2200" i="1">
-                                <a:latin typeface="Cambria Math"/>
-                              </a:rPr>
-                              <m:t>(</m:t>
-                            </m:r>
-                            <m:r>
-                              <a:rPr lang="en-US" sz="2200" i="1">
-                                <a:latin typeface="Cambria Math"/>
-                              </a:rPr>
-                              <m:t>𝑔</m:t>
-                            </m:r>
-                            <m:r>
-                              <a:rPr lang="en-US" sz="2200" i="1">
-                                <a:latin typeface="Cambria Math"/>
-                              </a:rPr>
-                              <m:t>(</m:t>
-                            </m:r>
-                            <m:r>
-                              <a:rPr lang="en-US" sz="2200" i="1">
-                                <a:latin typeface="Cambria Math"/>
-                              </a:rPr>
-                              <m:t>𝑖</m:t>
-                            </m:r>
-                            <m:r>
-                              <a:rPr lang="en-US" sz="2200" i="1">
-                                <a:latin typeface="Cambria Math"/>
-                              </a:rPr>
-                              <m:t>)⊕</m:t>
-                            </m:r>
-                            <m:r>
-                              <a:rPr lang="en-US" sz="2200" i="1">
-                                <a:latin typeface="Cambria Math"/>
-                              </a:rPr>
-                              <m:t>𝑔</m:t>
-                            </m:r>
-                            <m:r>
-                              <a:rPr lang="en-US" sz="2200" i="1">
-                                <a:latin typeface="Cambria Math"/>
-                              </a:rPr>
-                              <m:t>(</m:t>
-                            </m:r>
-                            <m:r>
-                              <a:rPr lang="en-US" sz="2200" i="1">
-                                <a:latin typeface="Cambria Math"/>
-                              </a:rPr>
-                              <m:t>𝑛</m:t>
-                            </m:r>
-                            <m:r>
-                              <a:rPr lang="en-US" sz="2200" i="1">
-                                <a:latin typeface="Cambria Math"/>
-                              </a:rPr>
-                              <m:t>−1−</m:t>
-                            </m:r>
-                            <m:r>
-                              <a:rPr lang="en-US" sz="2200" i="1">
-                                <a:latin typeface="Cambria Math"/>
-                              </a:rPr>
-                              <m:t>𝑖</m:t>
-                            </m:r>
-                            <m:r>
-                              <a:rPr lang="en-US" sz="2200" i="1">
-                                <a:latin typeface="Cambria Math"/>
-                              </a:rPr>
-                              <m:t>)</m:t>
-                            </m:r>
-                          </m:e>
-                        </m:nary>
-                        <m:r>
-                          <a:rPr lang="en-US" sz="2200" i="1">
-                            <a:latin typeface="Cambria Math"/>
-                          </a:rPr>
-                          <m:t>,</m:t>
-                        </m:r>
-                        <m:nary>
-                          <m:naryPr>
-                            <m:chr m:val="⋃"/>
-                            <m:limLoc m:val="undOvr"/>
-                            <m:ctrlPr>
-                              <a:rPr lang="en-US" sz="2200" i="1">
-                                <a:latin typeface="Cambria Math"/>
-                              </a:rPr>
-                            </m:ctrlPr>
-                          </m:naryPr>
-                          <m:sub>
-                            <m:r>
-                              <a:rPr lang="en-US" sz="2200" i="1">
-                                <a:latin typeface="Cambria Math"/>
-                              </a:rPr>
-                              <m:t>𝑖</m:t>
-                            </m:r>
-                            <m:r>
-                              <a:rPr lang="en-US" sz="2200" i="1">
-                                <a:latin typeface="Cambria Math"/>
-                              </a:rPr>
-                              <m:t>=0</m:t>
-                            </m:r>
-                          </m:sub>
-                          <m:sup>
-                            <m:r>
-                              <a:rPr lang="en-US" sz="2200" i="1">
-                                <a:latin typeface="Cambria Math"/>
-                              </a:rPr>
-                              <m:t>𝑛</m:t>
-                            </m:r>
-                            <m:r>
-                              <a:rPr lang="en-US" sz="2200" i="1">
-                                <a:latin typeface="Cambria Math"/>
-                              </a:rPr>
-                              <m:t>−2</m:t>
-                            </m:r>
-                          </m:sup>
-                          <m:e>
-                            <m:r>
-                              <a:rPr lang="en-US" sz="2200" i="1">
-                                <a:latin typeface="Cambria Math"/>
-                              </a:rPr>
-                              <m:t>(</m:t>
-                            </m:r>
-                            <m:r>
-                              <a:rPr lang="en-US" sz="2200" i="1">
-                                <a:latin typeface="Cambria Math"/>
-                              </a:rPr>
-                              <m:t>𝑔</m:t>
-                            </m:r>
-                            <m:r>
-                              <a:rPr lang="en-US" sz="2200" i="1">
-                                <a:latin typeface="Cambria Math"/>
-                              </a:rPr>
-                              <m:t>(</m:t>
-                            </m:r>
-                            <m:r>
-                              <a:rPr lang="en-US" sz="2200" i="1">
-                                <a:latin typeface="Cambria Math"/>
-                              </a:rPr>
-                              <m:t>𝑖</m:t>
-                            </m:r>
-                            <m:r>
-                              <a:rPr lang="en-US" sz="2200" i="1">
-                                <a:latin typeface="Cambria Math"/>
-                              </a:rPr>
-                              <m:t>)⊕</m:t>
-                            </m:r>
-                            <m:r>
-                              <a:rPr lang="en-US" sz="2200" i="1">
-                                <a:latin typeface="Cambria Math"/>
-                              </a:rPr>
-                              <m:t>𝑔</m:t>
-                            </m:r>
-                            <m:r>
-                              <a:rPr lang="en-US" sz="2200" i="1">
-                                <a:latin typeface="Cambria Math"/>
-                              </a:rPr>
-                              <m:t>(</m:t>
-                            </m:r>
-                            <m:r>
-                              <a:rPr lang="en-US" sz="2200" i="1">
-                                <a:latin typeface="Cambria Math"/>
-                              </a:rPr>
-                              <m:t>𝑛</m:t>
-                            </m:r>
-                            <m:r>
-                              <a:rPr lang="en-US" sz="2200" i="1">
-                                <a:latin typeface="Cambria Math"/>
-                              </a:rPr>
-                              <m:t>−2−</m:t>
-                            </m:r>
-                            <m:r>
-                              <a:rPr lang="en-US" sz="2200" i="1">
-                                <a:latin typeface="Cambria Math"/>
-                              </a:rPr>
-                              <m:t>𝑖</m:t>
-                            </m:r>
-                            <m:r>
-                              <a:rPr lang="en-US" sz="2200" i="1">
-                                <a:latin typeface="Cambria Math"/>
-                              </a:rPr>
-                              <m:t>)</m:t>
-                            </m:r>
-                          </m:e>
-                        </m:nary>
-                      </m:e>
-                    </m:d>
-                  </m:oMath>
-                </a14:m>
-                <a:endParaRPr lang="en-US" sz="2200" dirty="0"/>
-              </a:p>
-            </p:txBody>
-          </p:sp>
-        </mc:Choice>
-        <mc:Fallback xmlns="">
-          <p:sp>
-            <p:nvSpPr>
-              <p:cNvPr id="7" name="Content Placeholder 2"/>
-              <p:cNvSpPr>
-                <a:spLocks noGrp="1" noRot="1" noChangeAspect="1" noMove="1" noResize="1" noEditPoints="1" noAdjustHandles="1" noChangeArrowheads="1" noChangeShapeType="1" noTextEdit="1"/>
-              </p:cNvSpPr>
-              <p:nvPr>
-                <p:ph idx="1"/>
-              </p:nvPr>
-            </p:nvSpPr>
-            <p:spPr>
-              <a:xfrm>
-                <a:off x="152400" y="3733800"/>
-                <a:ext cx="8991600" cy="762000"/>
-              </a:xfrm>
-              <a:blipFill rotWithShape="1">
-                <a:blip r:embed="rId2"/>
-                <a:stretch>
-                  <a:fillRect l="-746" t="-48800" b="-41600"/>
-                </a:stretch>
-              </a:blipFill>
-            </p:spPr>
-            <p:txBody>
-              <a:bodyPr/>
-              <a:lstStyle/>
-              <a:p>
-                <a:r>
-                  <a:rPr lang="en-US">
-                    <a:noFill/>
-                  </a:rPr>
-                  <a:t> </a:t>
-                </a:r>
-              </a:p>
-            </p:txBody>
-          </p:sp>
-        </mc:Fallback>
-      </mc:AlternateContent>
-    </p:spTree>
-    <p:extLst>
-      <p:ext uri="{BB962C8B-B14F-4D97-AF65-F5344CB8AC3E}">
-        <p14:creationId xmlns:p14="http://schemas.microsoft.com/office/powerpoint/2010/main" val="733387478"/>
-      </p:ext>
-    </p:extLst>
-  </p:cSld>
-  <p:clrMapOvr>
-    <a:masterClrMapping/>
-  </p:clrMapOvr>
-  <p:timing>
-    <p:tnLst>
-      <p:par>
-        <p:cTn id="1" dur="indefinite" restart="never" nodeType="tmRoot"/>
-      </p:par>
-    </p:tnLst>
-  </p:timing>
-</p:sld>
-</file>
-
-<file path=ppt/slides/slide14.xml><?xml version="1.0" encoding="utf-8"?>
-<p:sld xmlns:a="http://schemas.openxmlformats.org/drawingml/2006/main" xmlns:r="http://schemas.openxmlformats.org/officeDocument/2006/relationships" xmlns:p="http://schemas.openxmlformats.org/presentationml/2006/main">
-  <p:cSld>
-    <p:spTree>
-      <p:nvGrpSpPr>
-        <p:cNvPr id="1" name=""/>
-        <p:cNvGrpSpPr/>
-        <p:nvPr/>
-      </p:nvGrpSpPr>
-      <p:grpSpPr>
-        <a:xfrm>
-          <a:off x="0" y="0"/>
-          <a:ext cx="0" cy="0"/>
-          <a:chOff x="0" y="0"/>
-          <a:chExt cx="0" cy="0"/>
-        </a:xfrm>
-      </p:grpSpPr>
-      <p:sp>
-        <p:nvSpPr>
-          <p:cNvPr id="2" name="Title 1"/>
-          <p:cNvSpPr>
-            <a:spLocks noGrp="1"/>
-          </p:cNvSpPr>
-          <p:nvPr>
-            <p:ph type="title"/>
-          </p:nvPr>
-        </p:nvSpPr>
-        <p:spPr/>
-        <p:txBody>
-          <a:bodyPr/>
-          <a:lstStyle/>
-          <a:p>
-            <a:r>
-              <a:rPr lang="uk-UA" b="1" dirty="0" smtClean="0"/>
-              <a:t>Приклад</a:t>
-            </a:r>
-            <a:endParaRPr lang="en-US" b="1" dirty="0"/>
-          </a:p>
-        </p:txBody>
-      </p:sp>
-      <p:sp>
-        <p:nvSpPr>
-          <p:cNvPr id="4" name="Title 1"/>
-          <p:cNvSpPr txBox="1">
-            <a:spLocks/>
-          </p:cNvSpPr>
-          <p:nvPr/>
-        </p:nvSpPr>
-        <p:spPr>
-          <a:xfrm>
-            <a:off x="609600" y="1905000"/>
-            <a:ext cx="8229600" cy="800100"/>
-          </a:xfrm>
-          <a:prstGeom prst="rect">
-            <a:avLst/>
-          </a:prstGeom>
-        </p:spPr>
-        <p:txBody>
-          <a:bodyPr vert="horz" lIns="91440" tIns="45720" rIns="91440" bIns="45720" rtlCol="0" anchor="b">
-            <a:noAutofit/>
-          </a:bodyPr>
-          <a:lstStyle>
-            <a:lvl1pPr algn="ctr" defTabSz="914400" rtl="0" eaLnBrk="1" latinLnBrk="0" hangingPunct="1">
-              <a:lnSpc>
-                <a:spcPts val="5800"/>
-              </a:lnSpc>
-              <a:spcBef>
-                <a:spcPct val="0"/>
-              </a:spcBef>
-              <a:buNone/>
-              <a:defRPr sz="5400" kern="1200">
-                <a:solidFill>
-                  <a:schemeClr val="tx2"/>
-                </a:solidFill>
-                <a:effectLst>
-                  <a:outerShdw blurRad="63500" dist="38100" dir="5400000" algn="t" rotWithShape="0">
-                    <a:prstClr val="black">
-                      <a:alpha val="25000"/>
-                    </a:prstClr>
-                  </a:outerShdw>
-                </a:effectLst>
-                <a:latin typeface="+mn-lt"/>
-                <a:ea typeface="+mj-ea"/>
-                <a:cs typeface="+mj-cs"/>
-              </a:defRPr>
-            </a:lvl1pPr>
-          </a:lstStyle>
-          <a:p>
-            <a:r>
-              <a:rPr lang="uk-UA" sz="4400" dirty="0" smtClean="0"/>
-              <a:t>Гра </a:t>
-            </a:r>
-            <a:r>
-              <a:rPr lang="uk-UA" sz="4400" dirty="0" smtClean="0"/>
-              <a:t>«</a:t>
-            </a:r>
-            <a:r>
-              <a:rPr lang="uk-UA" sz="4400" dirty="0" smtClean="0"/>
-              <a:t>Гризун</a:t>
-            </a:r>
-            <a:r>
-              <a:rPr lang="uk-UA" sz="4400" dirty="0" smtClean="0"/>
-              <a:t>» («</a:t>
-            </a:r>
-            <a:r>
-              <a:rPr lang="en-US" sz="4400" dirty="0" smtClean="0"/>
-              <a:t>Chomp</a:t>
-            </a:r>
-            <a:r>
-              <a:rPr lang="uk-UA" sz="4400" dirty="0" smtClean="0"/>
-              <a:t>»</a:t>
-            </a:r>
-            <a:r>
-              <a:rPr lang="en-US" sz="4400" dirty="0" smtClean="0"/>
-              <a:t>)</a:t>
-            </a:r>
-            <a:endParaRPr lang="en-US" sz="4400" dirty="0"/>
-          </a:p>
-        </p:txBody>
-      </p:sp>
-      <mc:AlternateContent xmlns:mc="http://schemas.openxmlformats.org/markup-compatibility/2006">
-        <mc:Choice xmlns:a14="http://schemas.microsoft.com/office/drawing/2010/main" Requires="a14">
           <p:sp>
             <p:nvSpPr>
               <p:cNvPr id="7" name="Content Placeholder 2"/>
@@ -5814,7 +5458,7 @@
             </p:txBody>
           </p:sp>
         </mc:Choice>
-        <mc:Fallback>
+        <mc:Fallback xmlns="">
           <p:sp>
             <p:nvSpPr>
               <p:cNvPr id="7" name="Content Placeholder 2"/>
@@ -5873,6 +5517,138 @@
 </file>
 
 <file path=ppt/slides/slide15.xml><?xml version="1.0" encoding="utf-8"?>
+<p:sld xmlns:a="http://schemas.openxmlformats.org/drawingml/2006/main" xmlns:r="http://schemas.openxmlformats.org/officeDocument/2006/relationships" xmlns:p="http://schemas.openxmlformats.org/presentationml/2006/main">
+  <p:cSld>
+    <p:spTree>
+      <p:nvGrpSpPr>
+        <p:cNvPr id="1" name=""/>
+        <p:cNvGrpSpPr/>
+        <p:nvPr/>
+      </p:nvGrpSpPr>
+      <p:grpSpPr>
+        <a:xfrm>
+          <a:off x="0" y="0"/>
+          <a:ext cx="0" cy="0"/>
+          <a:chOff x="0" y="0"/>
+          <a:chExt cx="0" cy="0"/>
+        </a:xfrm>
+      </p:grpSpPr>
+      <p:sp>
+        <p:nvSpPr>
+          <p:cNvPr id="2" name="Title 1"/>
+          <p:cNvSpPr>
+            <a:spLocks noGrp="1"/>
+          </p:cNvSpPr>
+          <p:nvPr>
+            <p:ph type="title"/>
+          </p:nvPr>
+        </p:nvSpPr>
+        <p:spPr/>
+        <p:txBody>
+          <a:bodyPr/>
+          <a:lstStyle/>
+          <a:p>
+            <a:r>
+              <a:rPr lang="uk-UA" b="1" dirty="0" smtClean="0"/>
+              <a:t>Висновок</a:t>
+            </a:r>
+            <a:endParaRPr lang="en-US" b="1" dirty="0"/>
+          </a:p>
+        </p:txBody>
+      </p:sp>
+      <p:sp>
+        <p:nvSpPr>
+          <p:cNvPr id="3" name="Content Placeholder 2"/>
+          <p:cNvSpPr>
+            <a:spLocks noGrp="1"/>
+          </p:cNvSpPr>
+          <p:nvPr>
+            <p:ph idx="1"/>
+          </p:nvPr>
+        </p:nvSpPr>
+        <p:spPr>
+          <a:xfrm>
+            <a:off x="457200" y="2362200"/>
+            <a:ext cx="8229600" cy="3505200"/>
+          </a:xfrm>
+        </p:spPr>
+        <p:txBody>
+          <a:bodyPr>
+            <a:normAutofit fontScale="77500" lnSpcReduction="20000"/>
+          </a:bodyPr>
+          <a:lstStyle/>
+          <a:p>
+            <a:pPr>
+              <a:lnSpc>
+                <a:spcPct val="220000"/>
+              </a:lnSpc>
+            </a:pPr>
+            <a:r>
+              <a:rPr lang="uk-UA" dirty="0" smtClean="0"/>
+              <a:t>Розглянуто рівноправні ігри</a:t>
+            </a:r>
+          </a:p>
+          <a:p>
+            <a:pPr>
+              <a:lnSpc>
+                <a:spcPct val="220000"/>
+              </a:lnSpc>
+            </a:pPr>
+            <a:r>
+              <a:rPr lang="uk-UA" dirty="0" smtClean="0"/>
+              <a:t>Викладено і реалізовано алгоритм їх розвязку</a:t>
+            </a:r>
+          </a:p>
+          <a:p>
+            <a:pPr>
+              <a:lnSpc>
+                <a:spcPct val="220000"/>
+              </a:lnSpc>
+            </a:pPr>
+            <a:r>
+              <a:rPr lang="uk-UA" dirty="0" smtClean="0"/>
+              <a:t>Проведено аналіз швидкодії, додані оптимізації</a:t>
+            </a:r>
+          </a:p>
+          <a:p>
+            <a:pPr>
+              <a:lnSpc>
+                <a:spcPct val="220000"/>
+              </a:lnSpc>
+            </a:pPr>
+            <a:r>
+              <a:rPr lang="uk-UA" dirty="0" smtClean="0"/>
+              <a:t>Знайдено спосіб пошуку оптимального ходу (для деяких ігор)</a:t>
+            </a:r>
+          </a:p>
+          <a:p>
+            <a:pPr>
+              <a:lnSpc>
+                <a:spcPct val="220000"/>
+              </a:lnSpc>
+            </a:pPr>
+            <a:r>
+              <a:rPr lang="uk-UA" dirty="0" smtClean="0"/>
+              <a:t>Проаналізовано можливі подальші дослідження</a:t>
+            </a:r>
+            <a:endParaRPr lang="en-US" dirty="0"/>
+          </a:p>
+        </p:txBody>
+      </p:sp>
+    </p:spTree>
+    <p:extLst>
+      <p:ext uri="{BB962C8B-B14F-4D97-AF65-F5344CB8AC3E}">
+        <p14:creationId xmlns:p14="http://schemas.microsoft.com/office/powerpoint/2010/main" val="1172000418"/>
+      </p:ext>
+    </p:extLst>
+  </p:cSld>
+  <p:clrMapOvr>
+    <a:masterClrMapping/>
+  </p:clrMapOvr>
+</p:sld>
+</file>
+
+<file path=ppt/slides/slide16.xml><?xml version="1.0" encoding="utf-8"?>
 <p:sld xmlns:a="http://schemas.openxmlformats.org/drawingml/2006/main" xmlns:r="http://schemas.openxmlformats.org/officeDocument/2006/relationships" xmlns:p="http://schemas.openxmlformats.org/presentationml/2006/main">
   <p:cSld>
     <p:spTree>

</xml_diff>